<commit_message>
Added cloud flow and project interfaces (VM)
</commit_message>
<xml_diff>
--- a/files/term project.pptx
+++ b/files/term project.pptx
@@ -12,13 +12,15 @@
     <p:sldId id="257" r:id="rId6"/>
     <p:sldId id="261" r:id="rId7"/>
     <p:sldId id="263" r:id="rId8"/>
-    <p:sldId id="264" r:id="rId9"/>
-    <p:sldId id="259" r:id="rId10"/>
-    <p:sldId id="270" r:id="rId11"/>
-    <p:sldId id="269" r:id="rId12"/>
-    <p:sldId id="266" r:id="rId13"/>
-    <p:sldId id="267" r:id="rId14"/>
-    <p:sldId id="268" r:id="rId15"/>
+    <p:sldId id="271" r:id="rId9"/>
+    <p:sldId id="264" r:id="rId10"/>
+    <p:sldId id="272" r:id="rId11"/>
+    <p:sldId id="259" r:id="rId12"/>
+    <p:sldId id="270" r:id="rId13"/>
+    <p:sldId id="269" r:id="rId14"/>
+    <p:sldId id="266" r:id="rId15"/>
+    <p:sldId id="267" r:id="rId16"/>
+    <p:sldId id="268" r:id="rId17"/>
   </p:sldIdLst>
   <p:sldSz cx="12192000" cy="6858000"/>
   <p:notesSz cx="6858000" cy="9144000"/>
@@ -276,7 +278,7 @@
           <a:p>
             <a:fld id="{8670BAED-6BDA-41EC-A432-22AB564DA49E}" type="datetimeFigureOut">
               <a:rPr lang="en-US" smtClean="0"/>
-              <a:t>12/5/2021</a:t>
+              <a:t>12/7/2021</a:t>
             </a:fld>
             <a:endParaRPr lang="en-US"/>
           </a:p>
@@ -474,7 +476,7 @@
           <a:p>
             <a:fld id="{8670BAED-6BDA-41EC-A432-22AB564DA49E}" type="datetimeFigureOut">
               <a:rPr lang="en-US" smtClean="0"/>
-              <a:t>12/5/2021</a:t>
+              <a:t>12/7/2021</a:t>
             </a:fld>
             <a:endParaRPr lang="en-US"/>
           </a:p>
@@ -682,7 +684,7 @@
           <a:p>
             <a:fld id="{8670BAED-6BDA-41EC-A432-22AB564DA49E}" type="datetimeFigureOut">
               <a:rPr lang="en-US" smtClean="0"/>
-              <a:t>12/5/2021</a:t>
+              <a:t>12/7/2021</a:t>
             </a:fld>
             <a:endParaRPr lang="en-US"/>
           </a:p>
@@ -912,7 +914,7 @@
           <a:p>
             <a:fld id="{8670BAED-6BDA-41EC-A432-22AB564DA49E}" type="datetimeFigureOut">
               <a:rPr lang="en-US" smtClean="0"/>
-              <a:t>12/5/2021</a:t>
+              <a:t>12/7/2021</a:t>
             </a:fld>
             <a:endParaRPr lang="en-US"/>
           </a:p>
@@ -1187,7 +1189,7 @@
           <a:p>
             <a:fld id="{8670BAED-6BDA-41EC-A432-22AB564DA49E}" type="datetimeFigureOut">
               <a:rPr lang="en-US" smtClean="0"/>
-              <a:t>12/5/2021</a:t>
+              <a:t>12/7/2021</a:t>
             </a:fld>
             <a:endParaRPr lang="en-US" dirty="0"/>
           </a:p>
@@ -1458,7 +1460,7 @@
           <a:p>
             <a:fld id="{8670BAED-6BDA-41EC-A432-22AB564DA49E}" type="datetimeFigureOut">
               <a:rPr lang="en-US" smtClean="0"/>
-              <a:t>12/5/2021</a:t>
+              <a:t>12/7/2021</a:t>
             </a:fld>
             <a:endParaRPr lang="en-US"/>
           </a:p>
@@ -1870,7 +1872,7 @@
           <a:p>
             <a:fld id="{8670BAED-6BDA-41EC-A432-22AB564DA49E}" type="datetimeFigureOut">
               <a:rPr lang="en-US" smtClean="0"/>
-              <a:t>12/5/2021</a:t>
+              <a:t>12/7/2021</a:t>
             </a:fld>
             <a:endParaRPr lang="en-US"/>
           </a:p>
@@ -2017,7 +2019,7 @@
           <a:p>
             <a:fld id="{8670BAED-6BDA-41EC-A432-22AB564DA49E}" type="datetimeFigureOut">
               <a:rPr lang="en-US" smtClean="0"/>
-              <a:t>12/5/2021</a:t>
+              <a:t>12/7/2021</a:t>
             </a:fld>
             <a:endParaRPr lang="en-US"/>
           </a:p>
@@ -2130,7 +2132,7 @@
           <a:p>
             <a:fld id="{8670BAED-6BDA-41EC-A432-22AB564DA49E}" type="datetimeFigureOut">
               <a:rPr lang="en-US" smtClean="0"/>
-              <a:t>12/5/2021</a:t>
+              <a:t>12/7/2021</a:t>
             </a:fld>
             <a:endParaRPr lang="en-US"/>
           </a:p>
@@ -2443,7 +2445,7 @@
           <a:p>
             <a:fld id="{8670BAED-6BDA-41EC-A432-22AB564DA49E}" type="datetimeFigureOut">
               <a:rPr lang="en-US" smtClean="0"/>
-              <a:t>12/5/2021</a:t>
+              <a:t>12/7/2021</a:t>
             </a:fld>
             <a:endParaRPr lang="en-US"/>
           </a:p>
@@ -2731,7 +2733,7 @@
           <a:p>
             <a:fld id="{8670BAED-6BDA-41EC-A432-22AB564DA49E}" type="datetimeFigureOut">
               <a:rPr lang="en-US" smtClean="0"/>
-              <a:t>12/5/2021</a:t>
+              <a:t>12/7/2021</a:t>
             </a:fld>
             <a:endParaRPr lang="en-US"/>
           </a:p>
@@ -2974,7 +2976,7 @@
             <a:fld id="{8670BAED-6BDA-41EC-A432-22AB564DA49E}" type="datetimeFigureOut">
               <a:rPr lang="en-US" smtClean="0"/>
               <a:pPr/>
-              <a:t>12/5/2021</a:t>
+              <a:t>12/7/2021</a:t>
             </a:fld>
             <a:endParaRPr lang="en-US" dirty="0"/>
           </a:p>
@@ -4164,12 +4166,41 @@
           <a:chExt cx="0" cy="0"/>
         </a:xfrm>
       </p:grpSpPr>
-      <p:sp>
-        <p:nvSpPr>
-          <p:cNvPr id="4" name="TextBox 3">
-            <a:extLst>
-              <a:ext uri="{FF2B5EF4-FFF2-40B4-BE49-F238E27FC236}">
-                <a16:creationId xmlns:a16="http://schemas.microsoft.com/office/drawing/2014/main" id="{5FB8603D-69A0-4932-8596-56FDEE5BE92D}"/>
+      <p:pic>
+        <p:nvPicPr>
+          <p:cNvPr id="5" name="Content Placeholder 4">
+            <a:extLst>
+              <a:ext uri="{FF2B5EF4-FFF2-40B4-BE49-F238E27FC236}">
+                <a16:creationId xmlns:a16="http://schemas.microsoft.com/office/drawing/2014/main" id="{0C3C3251-A989-477B-9500-04D10998147B}"/>
+              </a:ext>
+            </a:extLst>
+          </p:cNvPr>
+          <p:cNvPicPr>
+            <a:picLocks noGrp="1" noChangeAspect="1"/>
+          </p:cNvPicPr>
+          <p:nvPr>
+            <p:ph idx="1"/>
+          </p:nvPr>
+        </p:nvPicPr>
+        <p:blipFill>
+          <a:blip r:embed="rId2"/>
+          <a:stretch>
+            <a:fillRect/>
+          </a:stretch>
+        </p:blipFill>
+        <p:spPr>
+          <a:xfrm>
+            <a:off x="870546" y="878820"/>
+            <a:ext cx="10450907" cy="5878635"/>
+          </a:xfrm>
+        </p:spPr>
+      </p:pic>
+      <p:sp>
+        <p:nvSpPr>
+          <p:cNvPr id="6" name="TextBox 5">
+            <a:extLst>
+              <a:ext uri="{FF2B5EF4-FFF2-40B4-BE49-F238E27FC236}">
+                <a16:creationId xmlns:a16="http://schemas.microsoft.com/office/drawing/2014/main" id="{0FCEB889-F49C-4DFA-8E94-94F58B1CD4B1}"/>
               </a:ext>
             </a:extLst>
           </p:cNvPr>
@@ -4178,8 +4209,8 @@
         </p:nvSpPr>
         <p:spPr>
           <a:xfrm>
-            <a:off x="598960" y="655994"/>
-            <a:ext cx="2768600" cy="461665"/>
+            <a:off x="317500" y="355600"/>
+            <a:ext cx="7835900" cy="523220"/>
           </a:xfrm>
           <a:prstGeom prst="rect">
             <a:avLst/>
@@ -4193,7 +4224,7 @@
           <a:lstStyle/>
           <a:p>
             <a:r>
-              <a:rPr lang="en-US" sz="2400" dirty="0">
+              <a:rPr lang="en-US" sz="2800" b="1" dirty="0">
                 <a:ln w="0"/>
                 <a:effectLst>
                   <a:outerShdw blurRad="38100" dist="19050" dir="2700000" algn="tl" rotWithShape="0">
@@ -4202,88 +4233,9 @@
                     </a:schemeClr>
                   </a:outerShdw>
                 </a:effectLst>
+                <a:latin typeface="Garamond" panose="02020404030301010803" pitchFamily="18" charset="0"/>
               </a:rPr>
-              <a:t>Using the full dataset</a:t>
-            </a:r>
-          </a:p>
-        </p:txBody>
-      </p:sp>
-      <p:pic>
-        <p:nvPicPr>
-          <p:cNvPr id="7" name="Picture 6" descr="A picture containing text, monitor, screenshot&#10;&#10;Description automatically generated">
-            <a:extLst>
-              <a:ext uri="{FF2B5EF4-FFF2-40B4-BE49-F238E27FC236}">
-                <a16:creationId xmlns:a16="http://schemas.microsoft.com/office/drawing/2014/main" id="{2268EBCD-3A9E-4FDA-99AF-6FC99B7DDCFC}"/>
-              </a:ext>
-            </a:extLst>
-          </p:cNvPr>
-          <p:cNvPicPr>
-            <a:picLocks noChangeAspect="1"/>
-          </p:cNvPicPr>
-          <p:nvPr/>
-        </p:nvPicPr>
-        <p:blipFill>
-          <a:blip r:embed="rId2">
-            <a:extLst>
-              <a:ext uri="{28A0092B-C50C-407E-A947-70E740481C1C}">
-                <a14:useLocalDpi xmlns:a14="http://schemas.microsoft.com/office/drawing/2010/main" val="0"/>
-              </a:ext>
-            </a:extLst>
-          </a:blip>
-          <a:stretch>
-            <a:fillRect/>
-          </a:stretch>
-        </p:blipFill>
-        <p:spPr>
-          <a:xfrm>
-            <a:off x="0" y="1933876"/>
-            <a:ext cx="12192000" cy="2990248"/>
-          </a:xfrm>
-          <a:prstGeom prst="rect">
-            <a:avLst/>
-          </a:prstGeom>
-        </p:spPr>
-      </p:pic>
-      <p:sp>
-        <p:nvSpPr>
-          <p:cNvPr id="8" name="TextBox 7">
-            <a:extLst>
-              <a:ext uri="{FF2B5EF4-FFF2-40B4-BE49-F238E27FC236}">
-                <a16:creationId xmlns:a16="http://schemas.microsoft.com/office/drawing/2014/main" id="{472D7403-5FC4-4102-9A0D-487752EB3468}"/>
-              </a:ext>
-            </a:extLst>
-          </p:cNvPr>
-          <p:cNvSpPr txBox="1"/>
-          <p:nvPr/>
-        </p:nvSpPr>
-        <p:spPr>
-          <a:xfrm>
-            <a:off x="1120200" y="1483204"/>
-            <a:ext cx="2094690" cy="369332"/>
-          </a:xfrm>
-          <a:prstGeom prst="rect">
-            <a:avLst/>
-          </a:prstGeom>
-          <a:noFill/>
-        </p:spPr>
-        <p:txBody>
-          <a:bodyPr wrap="square" rtlCol="0">
-            <a:spAutoFit/>
-          </a:bodyPr>
-          <a:lstStyle/>
-          <a:p>
-            <a:r>
-              <a:rPr lang="en-US" dirty="0">
-                <a:ln w="0"/>
-                <a:effectLst>
-                  <a:outerShdw blurRad="38100" dist="19050" dir="2700000" algn="tl" rotWithShape="0">
-                    <a:schemeClr val="dk1">
-                      <a:alpha val="40000"/>
-                    </a:schemeClr>
-                  </a:outerShdw>
-                </a:effectLst>
-              </a:rPr>
-              <a:t>Cosine similarity</a:t>
+              <a:t>3. Project Interface</a:t>
             </a:r>
           </a:p>
         </p:txBody>
@@ -4291,7 +4243,7 @@
     </p:spTree>
     <p:extLst>
       <p:ext uri="{BB962C8B-B14F-4D97-AF65-F5344CB8AC3E}">
-        <p14:creationId xmlns:p14="http://schemas.microsoft.com/office/powerpoint/2010/main" val="2743228367"/>
+        <p14:creationId xmlns:p14="http://schemas.microsoft.com/office/powerpoint/2010/main" val="1832365053"/>
       </p:ext>
     </p:extLst>
   </p:cSld>
@@ -4320,6 +4272,496 @@
       </p:grpSpPr>
       <p:pic>
         <p:nvPicPr>
+          <p:cNvPr id="4" name="Picture 3">
+            <a:extLst>
+              <a:ext uri="{FF2B5EF4-FFF2-40B4-BE49-F238E27FC236}">
+                <a16:creationId xmlns:a16="http://schemas.microsoft.com/office/drawing/2014/main" id="{26C01C37-F496-46CF-989A-EB270E222556}"/>
+              </a:ext>
+            </a:extLst>
+          </p:cNvPr>
+          <p:cNvPicPr>
+            <a:picLocks noChangeAspect="1"/>
+          </p:cNvPicPr>
+          <p:nvPr/>
+        </p:nvPicPr>
+        <p:blipFill>
+          <a:blip r:embed="rId2"/>
+          <a:stretch>
+            <a:fillRect/>
+          </a:stretch>
+        </p:blipFill>
+        <p:spPr>
+          <a:xfrm>
+            <a:off x="6172200" y="1072937"/>
+            <a:ext cx="6019800" cy="2647950"/>
+          </a:xfrm>
+          <a:prstGeom prst="rect">
+            <a:avLst/>
+          </a:prstGeom>
+        </p:spPr>
+      </p:pic>
+      <p:pic>
+        <p:nvPicPr>
+          <p:cNvPr id="6" name="Picture 5">
+            <a:extLst>
+              <a:ext uri="{FF2B5EF4-FFF2-40B4-BE49-F238E27FC236}">
+                <a16:creationId xmlns:a16="http://schemas.microsoft.com/office/drawing/2014/main" id="{2297B3E6-2B6C-4A8D-9D8A-5EAF3FFB8088}"/>
+              </a:ext>
+            </a:extLst>
+          </p:cNvPr>
+          <p:cNvPicPr>
+            <a:picLocks noChangeAspect="1"/>
+          </p:cNvPicPr>
+          <p:nvPr/>
+        </p:nvPicPr>
+        <p:blipFill>
+          <a:blip r:embed="rId3"/>
+          <a:stretch>
+            <a:fillRect/>
+          </a:stretch>
+        </p:blipFill>
+        <p:spPr>
+          <a:xfrm>
+            <a:off x="6172200" y="3976559"/>
+            <a:ext cx="5572125" cy="2638425"/>
+          </a:xfrm>
+          <a:prstGeom prst="rect">
+            <a:avLst/>
+          </a:prstGeom>
+        </p:spPr>
+      </p:pic>
+      <p:pic>
+        <p:nvPicPr>
+          <p:cNvPr id="8" name="Picture 7">
+            <a:extLst>
+              <a:ext uri="{FF2B5EF4-FFF2-40B4-BE49-F238E27FC236}">
+                <a16:creationId xmlns:a16="http://schemas.microsoft.com/office/drawing/2014/main" id="{68013557-55A6-43AD-8286-CDC0DF6BD556}"/>
+              </a:ext>
+            </a:extLst>
+          </p:cNvPr>
+          <p:cNvPicPr>
+            <a:picLocks noChangeAspect="1"/>
+          </p:cNvPicPr>
+          <p:nvPr/>
+        </p:nvPicPr>
+        <p:blipFill>
+          <a:blip r:embed="rId4"/>
+          <a:stretch>
+            <a:fillRect/>
+          </a:stretch>
+        </p:blipFill>
+        <p:spPr>
+          <a:xfrm>
+            <a:off x="215088" y="3179640"/>
+            <a:ext cx="5476875" cy="2543175"/>
+          </a:xfrm>
+          <a:prstGeom prst="rect">
+            <a:avLst/>
+          </a:prstGeom>
+        </p:spPr>
+      </p:pic>
+      <p:sp>
+        <p:nvSpPr>
+          <p:cNvPr id="9" name="TextBox 8">
+            <a:extLst>
+              <a:ext uri="{FF2B5EF4-FFF2-40B4-BE49-F238E27FC236}">
+                <a16:creationId xmlns:a16="http://schemas.microsoft.com/office/drawing/2014/main" id="{F6F4993C-6676-47A3-B71E-D7356890347B}"/>
+              </a:ext>
+            </a:extLst>
+          </p:cNvPr>
+          <p:cNvSpPr txBox="1"/>
+          <p:nvPr/>
+        </p:nvSpPr>
+        <p:spPr>
+          <a:xfrm>
+            <a:off x="8698418" y="622095"/>
+            <a:ext cx="1449421" cy="369332"/>
+          </a:xfrm>
+          <a:prstGeom prst="rect">
+            <a:avLst/>
+          </a:prstGeom>
+          <a:noFill/>
+        </p:spPr>
+        <p:txBody>
+          <a:bodyPr wrap="square" rtlCol="0">
+            <a:spAutoFit/>
+          </a:bodyPr>
+          <a:lstStyle/>
+          <a:p>
+            <a:r>
+              <a:rPr lang="en-US" dirty="0">
+                <a:ln w="0"/>
+                <a:effectLst>
+                  <a:outerShdw blurRad="38100" dist="19050" dir="2700000" algn="tl" rotWithShape="0">
+                    <a:schemeClr val="dk1">
+                      <a:alpha val="40000"/>
+                    </a:schemeClr>
+                  </a:outerShdw>
+                </a:effectLst>
+              </a:rPr>
+              <a:t>LSH cosine</a:t>
+            </a:r>
+          </a:p>
+        </p:txBody>
+      </p:sp>
+      <p:sp>
+        <p:nvSpPr>
+          <p:cNvPr id="10" name="TextBox 9">
+            <a:extLst>
+              <a:ext uri="{FF2B5EF4-FFF2-40B4-BE49-F238E27FC236}">
+                <a16:creationId xmlns:a16="http://schemas.microsoft.com/office/drawing/2014/main" id="{7271E471-8400-4A4D-A005-5109648C2B3B}"/>
+              </a:ext>
+            </a:extLst>
+          </p:cNvPr>
+          <p:cNvSpPr txBox="1"/>
+          <p:nvPr/>
+        </p:nvSpPr>
+        <p:spPr>
+          <a:xfrm>
+            <a:off x="2108740" y="2810308"/>
+            <a:ext cx="2094690" cy="369332"/>
+          </a:xfrm>
+          <a:prstGeom prst="rect">
+            <a:avLst/>
+          </a:prstGeom>
+          <a:noFill/>
+        </p:spPr>
+        <p:txBody>
+          <a:bodyPr wrap="square" rtlCol="0">
+            <a:spAutoFit/>
+          </a:bodyPr>
+          <a:lstStyle/>
+          <a:p>
+            <a:r>
+              <a:rPr lang="en-US" dirty="0">
+                <a:ln w="0"/>
+                <a:effectLst>
+                  <a:outerShdw blurRad="38100" dist="19050" dir="2700000" algn="tl" rotWithShape="0">
+                    <a:schemeClr val="dk1">
+                      <a:alpha val="40000"/>
+                    </a:schemeClr>
+                  </a:outerShdw>
+                </a:effectLst>
+              </a:rPr>
+              <a:t>Cosine similarity</a:t>
+            </a:r>
+          </a:p>
+        </p:txBody>
+      </p:sp>
+      <p:sp>
+        <p:nvSpPr>
+          <p:cNvPr id="7" name="TextBox 6">
+            <a:extLst>
+              <a:ext uri="{FF2B5EF4-FFF2-40B4-BE49-F238E27FC236}">
+                <a16:creationId xmlns:a16="http://schemas.microsoft.com/office/drawing/2014/main" id="{B5A461CB-05DD-4EB2-B888-306A9DF0331F}"/>
+              </a:ext>
+            </a:extLst>
+          </p:cNvPr>
+          <p:cNvSpPr txBox="1"/>
+          <p:nvPr/>
+        </p:nvSpPr>
+        <p:spPr>
+          <a:xfrm>
+            <a:off x="215088" y="808958"/>
+            <a:ext cx="8483600" cy="461665"/>
+          </a:xfrm>
+          <a:prstGeom prst="rect">
+            <a:avLst/>
+          </a:prstGeom>
+          <a:noFill/>
+        </p:spPr>
+        <p:txBody>
+          <a:bodyPr wrap="square" rtlCol="0">
+            <a:spAutoFit/>
+          </a:bodyPr>
+          <a:lstStyle/>
+          <a:p>
+            <a:r>
+              <a:rPr lang="en-US" sz="2400" b="1" dirty="0">
+                <a:ln w="0"/>
+                <a:effectLst>
+                  <a:outerShdw blurRad="38100" dist="19050" dir="2700000" algn="tl" rotWithShape="0">
+                    <a:schemeClr val="dk1">
+                      <a:alpha val="40000"/>
+                    </a:schemeClr>
+                  </a:outerShdw>
+                </a:effectLst>
+                <a:latin typeface="Garamond" panose="02020404030301010803" pitchFamily="18" charset="0"/>
+              </a:rPr>
+              <a:t>4.1 Contend-based filtering recommendations</a:t>
+            </a:r>
+            <a:endParaRPr lang="en-US" sz="1600" b="1" dirty="0">
+              <a:latin typeface="Garamond" panose="02020404030301010803" pitchFamily="18" charset="0"/>
+            </a:endParaRPr>
+          </a:p>
+        </p:txBody>
+      </p:sp>
+      <p:sp>
+        <p:nvSpPr>
+          <p:cNvPr id="11" name="TextBox 10">
+            <a:extLst>
+              <a:ext uri="{FF2B5EF4-FFF2-40B4-BE49-F238E27FC236}">
+                <a16:creationId xmlns:a16="http://schemas.microsoft.com/office/drawing/2014/main" id="{EF613FAE-C13D-403E-9E17-11A21E74DEA3}"/>
+              </a:ext>
+            </a:extLst>
+          </p:cNvPr>
+          <p:cNvSpPr txBox="1"/>
+          <p:nvPr/>
+        </p:nvSpPr>
+        <p:spPr>
+          <a:xfrm>
+            <a:off x="203200" y="355600"/>
+            <a:ext cx="7835900" cy="523220"/>
+          </a:xfrm>
+          <a:prstGeom prst="rect">
+            <a:avLst/>
+          </a:prstGeom>
+          <a:noFill/>
+        </p:spPr>
+        <p:txBody>
+          <a:bodyPr wrap="square" rtlCol="0">
+            <a:spAutoFit/>
+          </a:bodyPr>
+          <a:lstStyle/>
+          <a:p>
+            <a:r>
+              <a:rPr lang="en-US" sz="2800" b="1" dirty="0">
+                <a:ln w="0"/>
+                <a:effectLst>
+                  <a:outerShdw blurRad="38100" dist="19050" dir="2700000" algn="tl" rotWithShape="0">
+                    <a:schemeClr val="dk1">
+                      <a:alpha val="40000"/>
+                    </a:schemeClr>
+                  </a:outerShdw>
+                </a:effectLst>
+                <a:latin typeface="Garamond" panose="02020404030301010803" pitchFamily="18" charset="0"/>
+              </a:rPr>
+              <a:t>4. Results </a:t>
+            </a:r>
+          </a:p>
+        </p:txBody>
+      </p:sp>
+      <p:sp>
+        <p:nvSpPr>
+          <p:cNvPr id="2" name="TextBox 1">
+            <a:extLst>
+              <a:ext uri="{FF2B5EF4-FFF2-40B4-BE49-F238E27FC236}">
+                <a16:creationId xmlns:a16="http://schemas.microsoft.com/office/drawing/2014/main" id="{1E2CCCE2-2D24-4FDC-B285-157F1CFE1EAB}"/>
+              </a:ext>
+            </a:extLst>
+          </p:cNvPr>
+          <p:cNvSpPr txBox="1"/>
+          <p:nvPr/>
+        </p:nvSpPr>
+        <p:spPr>
+          <a:xfrm>
+            <a:off x="1993900" y="1994299"/>
+            <a:ext cx="2768600" cy="461665"/>
+          </a:xfrm>
+          <a:prstGeom prst="rect">
+            <a:avLst/>
+          </a:prstGeom>
+          <a:noFill/>
+        </p:spPr>
+        <p:txBody>
+          <a:bodyPr wrap="square" rtlCol="0">
+            <a:spAutoFit/>
+          </a:bodyPr>
+          <a:lstStyle/>
+          <a:p>
+            <a:r>
+              <a:rPr lang="en-US" sz="2400" dirty="0"/>
+              <a:t>Using a sample</a:t>
+            </a:r>
+          </a:p>
+        </p:txBody>
+      </p:sp>
+    </p:spTree>
+    <p:extLst>
+      <p:ext uri="{BB962C8B-B14F-4D97-AF65-F5344CB8AC3E}">
+        <p14:creationId xmlns:p14="http://schemas.microsoft.com/office/powerpoint/2010/main" val="3665934960"/>
+      </p:ext>
+    </p:extLst>
+  </p:cSld>
+  <p:clrMapOvr>
+    <a:masterClrMapping/>
+  </p:clrMapOvr>
+</p:sld>
+</file>
+
+<file path=ppt/slides/slide12.xml><?xml version="1.0" encoding="utf-8"?>
+<p:sld xmlns:a="http://schemas.openxmlformats.org/drawingml/2006/main" xmlns:r="http://schemas.openxmlformats.org/officeDocument/2006/relationships" xmlns:p="http://schemas.openxmlformats.org/presentationml/2006/main">
+  <p:cSld>
+    <p:spTree>
+      <p:nvGrpSpPr>
+        <p:cNvPr id="1" name=""/>
+        <p:cNvGrpSpPr/>
+        <p:nvPr/>
+      </p:nvGrpSpPr>
+      <p:grpSpPr>
+        <a:xfrm>
+          <a:off x="0" y="0"/>
+          <a:ext cx="0" cy="0"/>
+          <a:chOff x="0" y="0"/>
+          <a:chExt cx="0" cy="0"/>
+        </a:xfrm>
+      </p:grpSpPr>
+      <p:sp>
+        <p:nvSpPr>
+          <p:cNvPr id="4" name="TextBox 3">
+            <a:extLst>
+              <a:ext uri="{FF2B5EF4-FFF2-40B4-BE49-F238E27FC236}">
+                <a16:creationId xmlns:a16="http://schemas.microsoft.com/office/drawing/2014/main" id="{5FB8603D-69A0-4932-8596-56FDEE5BE92D}"/>
+              </a:ext>
+            </a:extLst>
+          </p:cNvPr>
+          <p:cNvSpPr txBox="1"/>
+          <p:nvPr/>
+        </p:nvSpPr>
+        <p:spPr>
+          <a:xfrm>
+            <a:off x="598960" y="655994"/>
+            <a:ext cx="2768600" cy="461665"/>
+          </a:xfrm>
+          <a:prstGeom prst="rect">
+            <a:avLst/>
+          </a:prstGeom>
+          <a:noFill/>
+        </p:spPr>
+        <p:txBody>
+          <a:bodyPr wrap="square" rtlCol="0">
+            <a:spAutoFit/>
+          </a:bodyPr>
+          <a:lstStyle/>
+          <a:p>
+            <a:r>
+              <a:rPr lang="en-US" sz="2400" dirty="0">
+                <a:ln w="0"/>
+                <a:effectLst>
+                  <a:outerShdw blurRad="38100" dist="19050" dir="2700000" algn="tl" rotWithShape="0">
+                    <a:schemeClr val="dk1">
+                      <a:alpha val="40000"/>
+                    </a:schemeClr>
+                  </a:outerShdw>
+                </a:effectLst>
+              </a:rPr>
+              <a:t>Using the full dataset</a:t>
+            </a:r>
+          </a:p>
+        </p:txBody>
+      </p:sp>
+      <p:pic>
+        <p:nvPicPr>
+          <p:cNvPr id="7" name="Picture 6" descr="A picture containing text, monitor, screenshot&#10;&#10;Description automatically generated">
+            <a:extLst>
+              <a:ext uri="{FF2B5EF4-FFF2-40B4-BE49-F238E27FC236}">
+                <a16:creationId xmlns:a16="http://schemas.microsoft.com/office/drawing/2014/main" id="{2268EBCD-3A9E-4FDA-99AF-6FC99B7DDCFC}"/>
+              </a:ext>
+            </a:extLst>
+          </p:cNvPr>
+          <p:cNvPicPr>
+            <a:picLocks noChangeAspect="1"/>
+          </p:cNvPicPr>
+          <p:nvPr/>
+        </p:nvPicPr>
+        <p:blipFill>
+          <a:blip r:embed="rId2">
+            <a:extLst>
+              <a:ext uri="{28A0092B-C50C-407E-A947-70E740481C1C}">
+                <a14:useLocalDpi xmlns:a14="http://schemas.microsoft.com/office/drawing/2010/main" val="0"/>
+              </a:ext>
+            </a:extLst>
+          </a:blip>
+          <a:stretch>
+            <a:fillRect/>
+          </a:stretch>
+        </p:blipFill>
+        <p:spPr>
+          <a:xfrm>
+            <a:off x="0" y="1933876"/>
+            <a:ext cx="12192000" cy="2990248"/>
+          </a:xfrm>
+          <a:prstGeom prst="rect">
+            <a:avLst/>
+          </a:prstGeom>
+        </p:spPr>
+      </p:pic>
+      <p:sp>
+        <p:nvSpPr>
+          <p:cNvPr id="8" name="TextBox 7">
+            <a:extLst>
+              <a:ext uri="{FF2B5EF4-FFF2-40B4-BE49-F238E27FC236}">
+                <a16:creationId xmlns:a16="http://schemas.microsoft.com/office/drawing/2014/main" id="{472D7403-5FC4-4102-9A0D-487752EB3468}"/>
+              </a:ext>
+            </a:extLst>
+          </p:cNvPr>
+          <p:cNvSpPr txBox="1"/>
+          <p:nvPr/>
+        </p:nvSpPr>
+        <p:spPr>
+          <a:xfrm>
+            <a:off x="1120200" y="1483204"/>
+            <a:ext cx="2094690" cy="369332"/>
+          </a:xfrm>
+          <a:prstGeom prst="rect">
+            <a:avLst/>
+          </a:prstGeom>
+          <a:noFill/>
+        </p:spPr>
+        <p:txBody>
+          <a:bodyPr wrap="square" rtlCol="0">
+            <a:spAutoFit/>
+          </a:bodyPr>
+          <a:lstStyle/>
+          <a:p>
+            <a:r>
+              <a:rPr lang="en-US" dirty="0">
+                <a:ln w="0"/>
+                <a:effectLst>
+                  <a:outerShdw blurRad="38100" dist="19050" dir="2700000" algn="tl" rotWithShape="0">
+                    <a:schemeClr val="dk1">
+                      <a:alpha val="40000"/>
+                    </a:schemeClr>
+                  </a:outerShdw>
+                </a:effectLst>
+              </a:rPr>
+              <a:t>Cosine similarity</a:t>
+            </a:r>
+          </a:p>
+        </p:txBody>
+      </p:sp>
+    </p:spTree>
+    <p:extLst>
+      <p:ext uri="{BB962C8B-B14F-4D97-AF65-F5344CB8AC3E}">
+        <p14:creationId xmlns:p14="http://schemas.microsoft.com/office/powerpoint/2010/main" val="2743228367"/>
+      </p:ext>
+    </p:extLst>
+  </p:cSld>
+  <p:clrMapOvr>
+    <a:masterClrMapping/>
+  </p:clrMapOvr>
+</p:sld>
+</file>
+
+<file path=ppt/slides/slide13.xml><?xml version="1.0" encoding="utf-8"?>
+<p:sld xmlns:a="http://schemas.openxmlformats.org/drawingml/2006/main" xmlns:r="http://schemas.openxmlformats.org/officeDocument/2006/relationships" xmlns:p="http://schemas.openxmlformats.org/presentationml/2006/main">
+  <p:cSld>
+    <p:spTree>
+      <p:nvGrpSpPr>
+        <p:cNvPr id="1" name=""/>
+        <p:cNvGrpSpPr/>
+        <p:nvPr/>
+      </p:nvGrpSpPr>
+      <p:grpSpPr>
+        <a:xfrm>
+          <a:off x="0" y="0"/>
+          <a:ext cx="0" cy="0"/>
+          <a:chOff x="0" y="0"/>
+          <a:chExt cx="0" cy="0"/>
+        </a:xfrm>
+      </p:grpSpPr>
+      <p:pic>
+        <p:nvPicPr>
           <p:cNvPr id="4" name="Picture 3" descr="Text&#10;&#10;Description automatically generated">
             <a:extLst>
               <a:ext uri="{FF2B5EF4-FFF2-40B4-BE49-F238E27FC236}">
@@ -4468,7 +4910,7 @@
 </p:sld>
 </file>
 
-<file path=ppt/slides/slide12.xml><?xml version="1.0" encoding="utf-8"?>
+<file path=ppt/slides/slide14.xml><?xml version="1.0" encoding="utf-8"?>
 <p:sld xmlns:a="http://schemas.openxmlformats.org/drawingml/2006/main" xmlns:r="http://schemas.openxmlformats.org/officeDocument/2006/relationships" xmlns:p="http://schemas.openxmlformats.org/presentationml/2006/main">
   <p:cSld>
     <p:spTree>
@@ -4800,7 +5242,7 @@
 </p:sld>
 </file>
 
-<file path=ppt/slides/slide13.xml><?xml version="1.0" encoding="utf-8"?>
+<file path=ppt/slides/slide15.xml><?xml version="1.0" encoding="utf-8"?>
 <p:sld xmlns:a="http://schemas.openxmlformats.org/drawingml/2006/main" xmlns:r="http://schemas.openxmlformats.org/officeDocument/2006/relationships" xmlns:p="http://schemas.openxmlformats.org/presentationml/2006/main">
   <p:cSld>
     <p:spTree>
@@ -4857,7 +5299,7 @@
                 </a:effectLst>
                 <a:latin typeface="Garamond" panose="02020404030301010803" pitchFamily="18" charset="0"/>
               </a:rPr>
-              <a:t>4.3 comparison of Contend-based &amp; Collaborative filtering</a:t>
+              <a:t>4.3 Comparison of Contend-based &amp; Collaborative filtering</a:t>
             </a:r>
             <a:endParaRPr lang="en-US" sz="1600" b="1" dirty="0">
               <a:latin typeface="Garamond" panose="02020404030301010803" pitchFamily="18" charset="0"/>
@@ -4883,7 +5325,7 @@
 </p:sld>
 </file>
 
-<file path=ppt/slides/slide14.xml><?xml version="1.0" encoding="utf-8"?>
+<file path=ppt/slides/slide16.xml><?xml version="1.0" encoding="utf-8"?>
 <p:sld xmlns:a="http://schemas.openxmlformats.org/drawingml/2006/main" xmlns:r="http://schemas.openxmlformats.org/officeDocument/2006/relationships" xmlns:p="http://schemas.openxmlformats.org/presentationml/2006/main">
   <p:cSld>
     <p:bg>
@@ -10095,7 +10537,7 @@
         </p:nvSpPr>
         <p:spPr>
           <a:xfrm>
-            <a:off x="1120574" y="1707680"/>
+            <a:off x="709415" y="1713213"/>
             <a:ext cx="1322059" cy="646331"/>
           </a:xfrm>
           <a:prstGeom prst="rect">
@@ -10146,7 +10588,7 @@
         </p:nvSpPr>
         <p:spPr>
           <a:xfrm>
-            <a:off x="3574420" y="1707679"/>
+            <a:off x="3574419" y="1713213"/>
             <a:ext cx="1322059" cy="646331"/>
           </a:xfrm>
           <a:prstGeom prst="rect">
@@ -10176,6 +10618,621 @@
           </a:p>
         </p:txBody>
       </p:sp>
+      <p:pic>
+        <p:nvPicPr>
+          <p:cNvPr id="3" name="Picture 2" descr="Icon&#10;&#10;Description automatically generated">
+            <a:extLst>
+              <a:ext uri="{FF2B5EF4-FFF2-40B4-BE49-F238E27FC236}">
+                <a16:creationId xmlns:a16="http://schemas.microsoft.com/office/drawing/2014/main" id="{05031288-8425-49D4-A48A-9331DCAC6157}"/>
+              </a:ext>
+            </a:extLst>
+          </p:cNvPr>
+          <p:cNvPicPr>
+            <a:picLocks noChangeAspect="1"/>
+          </p:cNvPicPr>
+          <p:nvPr/>
+        </p:nvPicPr>
+        <p:blipFill>
+          <a:blip r:embed="rId2">
+            <a:extLst>
+              <a:ext uri="{28A0092B-C50C-407E-A947-70E740481C1C}">
+                <a14:useLocalDpi xmlns:a14="http://schemas.microsoft.com/office/drawing/2010/main" val="0"/>
+              </a:ext>
+            </a:extLst>
+          </a:blip>
+          <a:stretch>
+            <a:fillRect/>
+          </a:stretch>
+        </p:blipFill>
+        <p:spPr>
+          <a:xfrm>
+            <a:off x="3489161" y="2359544"/>
+            <a:ext cx="1492577" cy="1492577"/>
+          </a:xfrm>
+          <a:prstGeom prst="rect">
+            <a:avLst/>
+          </a:prstGeom>
+        </p:spPr>
+      </p:pic>
+      <p:pic>
+        <p:nvPicPr>
+          <p:cNvPr id="8" name="Picture 7" descr="Icon&#10;&#10;Description automatically generated">
+            <a:extLst>
+              <a:ext uri="{FF2B5EF4-FFF2-40B4-BE49-F238E27FC236}">
+                <a16:creationId xmlns:a16="http://schemas.microsoft.com/office/drawing/2014/main" id="{DE01A9CA-1613-4005-AF05-345A4BA58ECA}"/>
+              </a:ext>
+            </a:extLst>
+          </p:cNvPr>
+          <p:cNvPicPr>
+            <a:picLocks noChangeAspect="1"/>
+          </p:cNvPicPr>
+          <p:nvPr/>
+        </p:nvPicPr>
+        <p:blipFill>
+          <a:blip r:embed="rId3">
+            <a:extLst>
+              <a:ext uri="{28A0092B-C50C-407E-A947-70E740481C1C}">
+                <a14:useLocalDpi xmlns:a14="http://schemas.microsoft.com/office/drawing/2010/main" val="0"/>
+              </a:ext>
+            </a:extLst>
+          </a:blip>
+          <a:stretch>
+            <a:fillRect/>
+          </a:stretch>
+        </p:blipFill>
+        <p:spPr>
+          <a:xfrm>
+            <a:off x="624157" y="2359545"/>
+            <a:ext cx="1492577" cy="1492577"/>
+          </a:xfrm>
+          <a:prstGeom prst="rect">
+            <a:avLst/>
+          </a:prstGeom>
+        </p:spPr>
+      </p:pic>
+      <p:cxnSp>
+        <p:nvCxnSpPr>
+          <p:cNvPr id="14" name="Straight Arrow Connector 13">
+            <a:extLst>
+              <a:ext uri="{FF2B5EF4-FFF2-40B4-BE49-F238E27FC236}">
+                <a16:creationId xmlns:a16="http://schemas.microsoft.com/office/drawing/2014/main" id="{28F44433-A48A-4A68-BAC0-339C2611944B}"/>
+              </a:ext>
+            </a:extLst>
+          </p:cNvPr>
+          <p:cNvCxnSpPr/>
+          <p:nvPr/>
+        </p:nvCxnSpPr>
+        <p:spPr>
+          <a:xfrm flipH="1">
+            <a:off x="2187019" y="2865748"/>
+            <a:ext cx="1302142" cy="0"/>
+          </a:xfrm>
+          <a:prstGeom prst="straightConnector1">
+            <a:avLst/>
+          </a:prstGeom>
+          <a:ln>
+            <a:tailEnd type="triangle"/>
+          </a:ln>
+        </p:spPr>
+        <p:style>
+          <a:lnRef idx="3">
+            <a:schemeClr val="accent6"/>
+          </a:lnRef>
+          <a:fillRef idx="0">
+            <a:schemeClr val="accent6"/>
+          </a:fillRef>
+          <a:effectRef idx="2">
+            <a:schemeClr val="accent6"/>
+          </a:effectRef>
+          <a:fontRef idx="minor">
+            <a:schemeClr val="tx1"/>
+          </a:fontRef>
+        </p:style>
+      </p:cxnSp>
+      <p:cxnSp>
+        <p:nvCxnSpPr>
+          <p:cNvPr id="15" name="Straight Arrow Connector 14">
+            <a:extLst>
+              <a:ext uri="{FF2B5EF4-FFF2-40B4-BE49-F238E27FC236}">
+                <a16:creationId xmlns:a16="http://schemas.microsoft.com/office/drawing/2014/main" id="{0BD9FFE3-B0CD-446D-B1CB-205FE80A69A0}"/>
+              </a:ext>
+            </a:extLst>
+          </p:cNvPr>
+          <p:cNvCxnSpPr>
+            <a:cxnSpLocks/>
+          </p:cNvCxnSpPr>
+          <p:nvPr/>
+        </p:nvCxnSpPr>
+        <p:spPr>
+          <a:xfrm>
+            <a:off x="2187019" y="3206684"/>
+            <a:ext cx="1302142" cy="0"/>
+          </a:xfrm>
+          <a:prstGeom prst="straightConnector1">
+            <a:avLst/>
+          </a:prstGeom>
+          <a:ln>
+            <a:tailEnd type="triangle"/>
+          </a:ln>
+        </p:spPr>
+        <p:style>
+          <a:lnRef idx="3">
+            <a:schemeClr val="accent6"/>
+          </a:lnRef>
+          <a:fillRef idx="0">
+            <a:schemeClr val="accent6"/>
+          </a:fillRef>
+          <a:effectRef idx="2">
+            <a:schemeClr val="accent6"/>
+          </a:effectRef>
+          <a:fontRef idx="minor">
+            <a:schemeClr val="tx1"/>
+          </a:fontRef>
+        </p:style>
+      </p:cxnSp>
+      <p:sp>
+        <p:nvSpPr>
+          <p:cNvPr id="16" name="TextBox 15">
+            <a:extLst>
+              <a:ext uri="{FF2B5EF4-FFF2-40B4-BE49-F238E27FC236}">
+                <a16:creationId xmlns:a16="http://schemas.microsoft.com/office/drawing/2014/main" id="{04E20BC5-EE7F-4A6F-9986-89A8AB86E16D}"/>
+              </a:ext>
+            </a:extLst>
+          </p:cNvPr>
+          <p:cNvSpPr txBox="1"/>
+          <p:nvPr/>
+        </p:nvSpPr>
+        <p:spPr>
+          <a:xfrm>
+            <a:off x="2187019" y="2482219"/>
+            <a:ext cx="1325043" cy="369332"/>
+          </a:xfrm>
+          <a:prstGeom prst="rect">
+            <a:avLst/>
+          </a:prstGeom>
+          <a:noFill/>
+        </p:spPr>
+        <p:txBody>
+          <a:bodyPr wrap="none" rtlCol="0">
+            <a:spAutoFit/>
+          </a:bodyPr>
+          <a:lstStyle/>
+          <a:p>
+            <a:r>
+              <a:rPr lang="en-US" dirty="0"/>
+              <a:t>Request data</a:t>
+            </a:r>
+          </a:p>
+        </p:txBody>
+      </p:sp>
+      <p:sp>
+        <p:nvSpPr>
+          <p:cNvPr id="17" name="TextBox 16">
+            <a:extLst>
+              <a:ext uri="{FF2B5EF4-FFF2-40B4-BE49-F238E27FC236}">
+                <a16:creationId xmlns:a16="http://schemas.microsoft.com/office/drawing/2014/main" id="{0C460722-483A-4B0A-B3F3-7CA2E1768916}"/>
+              </a:ext>
+            </a:extLst>
+          </p:cNvPr>
+          <p:cNvSpPr txBox="1"/>
+          <p:nvPr/>
+        </p:nvSpPr>
+        <p:spPr>
+          <a:xfrm>
+            <a:off x="2223755" y="3206684"/>
+            <a:ext cx="1228670" cy="369332"/>
+          </a:xfrm>
+          <a:prstGeom prst="rect">
+            <a:avLst/>
+          </a:prstGeom>
+          <a:noFill/>
+        </p:spPr>
+        <p:txBody>
+          <a:bodyPr wrap="none" rtlCol="0">
+            <a:spAutoFit/>
+          </a:bodyPr>
+          <a:lstStyle/>
+          <a:p>
+            <a:r>
+              <a:rPr lang="en-US" dirty="0"/>
+              <a:t>Return data</a:t>
+            </a:r>
+          </a:p>
+        </p:txBody>
+      </p:sp>
+      <p:sp>
+        <p:nvSpPr>
+          <p:cNvPr id="18" name="Speech Bubble: Rectangle 17">
+            <a:extLst>
+              <a:ext uri="{FF2B5EF4-FFF2-40B4-BE49-F238E27FC236}">
+                <a16:creationId xmlns:a16="http://schemas.microsoft.com/office/drawing/2014/main" id="{B48D7158-0902-48A6-9652-C257C34BEE42}"/>
+              </a:ext>
+            </a:extLst>
+          </p:cNvPr>
+          <p:cNvSpPr/>
+          <p:nvPr/>
+        </p:nvSpPr>
+        <p:spPr>
+          <a:xfrm>
+            <a:off x="2550193" y="4709232"/>
+            <a:ext cx="3370509" cy="1492576"/>
+          </a:xfrm>
+          <a:prstGeom prst="wedgeRectCallout">
+            <a:avLst>
+              <a:gd name="adj1" fmla="val 165"/>
+              <a:gd name="adj2" fmla="val -115700"/>
+            </a:avLst>
+          </a:prstGeom>
+          <a:noFill/>
+          <a:ln w="9525" cap="flat" cmpd="sng" algn="ctr">
+            <a:solidFill>
+              <a:schemeClr val="accent6"/>
+            </a:solidFill>
+            <a:prstDash val="solid"/>
+            <a:round/>
+            <a:headEnd type="none" w="med" len="med"/>
+            <a:tailEnd type="none" w="med" len="med"/>
+          </a:ln>
+        </p:spPr>
+        <p:style>
+          <a:lnRef idx="0">
+            <a:scrgbClr r="0" g="0" b="0"/>
+          </a:lnRef>
+          <a:fillRef idx="0">
+            <a:scrgbClr r="0" g="0" b="0"/>
+          </a:fillRef>
+          <a:effectRef idx="0">
+            <a:scrgbClr r="0" g="0" b="0"/>
+          </a:effectRef>
+          <a:fontRef idx="minor">
+            <a:schemeClr val="accent6"/>
+          </a:fontRef>
+        </p:style>
+        <p:txBody>
+          <a:bodyPr rtlCol="0" anchor="ctr"/>
+          <a:lstStyle/>
+          <a:p>
+            <a:pPr marL="285750" indent="-285750">
+              <a:buFontTx/>
+              <a:buChar char="-"/>
+            </a:pPr>
+            <a:r>
+              <a:rPr lang="en-US" dirty="0">
+                <a:solidFill>
+                  <a:schemeClr val="tx1"/>
+                </a:solidFill>
+              </a:rPr>
+              <a:t>8vCPU, 64 GB, Windows Server</a:t>
+            </a:r>
+          </a:p>
+          <a:p>
+            <a:pPr marL="285750" indent="-285750">
+              <a:buFontTx/>
+              <a:buChar char="-"/>
+            </a:pPr>
+            <a:r>
+              <a:rPr lang="en-US" dirty="0">
+                <a:solidFill>
+                  <a:schemeClr val="tx1"/>
+                </a:solidFill>
+              </a:rPr>
+              <a:t>Deployed Python code</a:t>
+            </a:r>
+          </a:p>
+          <a:p>
+            <a:pPr marL="285750" indent="-285750">
+              <a:buFontTx/>
+              <a:buChar char="-"/>
+            </a:pPr>
+            <a:r>
+              <a:rPr lang="en-US" dirty="0">
+                <a:solidFill>
+                  <a:schemeClr val="tx1"/>
+                </a:solidFill>
+              </a:rPr>
+              <a:t>Auto-scaling, security</a:t>
+            </a:r>
+          </a:p>
+          <a:p>
+            <a:pPr marL="285750" indent="-285750">
+              <a:buFontTx/>
+              <a:buChar char="-"/>
+            </a:pPr>
+            <a:r>
+              <a:rPr lang="en-US" dirty="0">
+                <a:solidFill>
+                  <a:schemeClr val="tx1"/>
+                </a:solidFill>
+              </a:rPr>
+              <a:t>99.9% uptime</a:t>
+            </a:r>
+          </a:p>
+        </p:txBody>
+      </p:sp>
+      <p:cxnSp>
+        <p:nvCxnSpPr>
+          <p:cNvPr id="29" name="Connector: Elbow 28">
+            <a:extLst>
+              <a:ext uri="{FF2B5EF4-FFF2-40B4-BE49-F238E27FC236}">
+                <a16:creationId xmlns:a16="http://schemas.microsoft.com/office/drawing/2014/main" id="{F0FC9267-F703-4EE9-A038-2CC54E6D3C46}"/>
+              </a:ext>
+            </a:extLst>
+          </p:cNvPr>
+          <p:cNvCxnSpPr>
+            <a:cxnSpLocks/>
+            <a:stCxn id="3" idx="3"/>
+            <a:endCxn id="33" idx="1"/>
+          </p:cNvCxnSpPr>
+          <p:nvPr/>
+        </p:nvCxnSpPr>
+        <p:spPr>
+          <a:xfrm flipV="1">
+            <a:off x="4981738" y="1616717"/>
+            <a:ext cx="2663400" cy="1489116"/>
+          </a:xfrm>
+          <a:prstGeom prst="bentConnector3">
+            <a:avLst/>
+          </a:prstGeom>
+          <a:ln>
+            <a:tailEnd type="triangle"/>
+          </a:ln>
+        </p:spPr>
+        <p:style>
+          <a:lnRef idx="3">
+            <a:schemeClr val="accent6"/>
+          </a:lnRef>
+          <a:fillRef idx="0">
+            <a:schemeClr val="accent6"/>
+          </a:fillRef>
+          <a:effectRef idx="2">
+            <a:schemeClr val="accent6"/>
+          </a:effectRef>
+          <a:fontRef idx="minor">
+            <a:schemeClr val="tx1"/>
+          </a:fontRef>
+        </p:style>
+      </p:cxnSp>
+      <p:cxnSp>
+        <p:nvCxnSpPr>
+          <p:cNvPr id="31" name="Connector: Elbow 30">
+            <a:extLst>
+              <a:ext uri="{FF2B5EF4-FFF2-40B4-BE49-F238E27FC236}">
+                <a16:creationId xmlns:a16="http://schemas.microsoft.com/office/drawing/2014/main" id="{27907F4A-0E78-46F6-BB39-A985387CD009}"/>
+              </a:ext>
+            </a:extLst>
+          </p:cNvPr>
+          <p:cNvCxnSpPr>
+            <a:cxnSpLocks/>
+            <a:stCxn id="3" idx="3"/>
+          </p:cNvCxnSpPr>
+          <p:nvPr/>
+        </p:nvCxnSpPr>
+        <p:spPr>
+          <a:xfrm flipV="1">
+            <a:off x="4981738" y="3105832"/>
+            <a:ext cx="2663400" cy="1"/>
+          </a:xfrm>
+          <a:prstGeom prst="bentConnector3">
+            <a:avLst>
+              <a:gd name="adj1" fmla="val 49646"/>
+            </a:avLst>
+          </a:prstGeom>
+          <a:ln>
+            <a:tailEnd type="triangle"/>
+          </a:ln>
+        </p:spPr>
+        <p:style>
+          <a:lnRef idx="3">
+            <a:schemeClr val="accent6"/>
+          </a:lnRef>
+          <a:fillRef idx="0">
+            <a:schemeClr val="accent6"/>
+          </a:fillRef>
+          <a:effectRef idx="2">
+            <a:schemeClr val="accent6"/>
+          </a:effectRef>
+          <a:fontRef idx="minor">
+            <a:schemeClr val="tx1"/>
+          </a:fontRef>
+        </p:style>
+      </p:cxnSp>
+      <p:sp>
+        <p:nvSpPr>
+          <p:cNvPr id="33" name="Rectangle 32">
+            <a:extLst>
+              <a:ext uri="{FF2B5EF4-FFF2-40B4-BE49-F238E27FC236}">
+                <a16:creationId xmlns:a16="http://schemas.microsoft.com/office/drawing/2014/main" id="{59F9BE29-E3C1-41AE-AFB4-DF655EAE5B1C}"/>
+              </a:ext>
+            </a:extLst>
+          </p:cNvPr>
+          <p:cNvSpPr/>
+          <p:nvPr/>
+        </p:nvSpPr>
+        <p:spPr>
+          <a:xfrm>
+            <a:off x="7645138" y="1197224"/>
+            <a:ext cx="2771480" cy="838986"/>
+          </a:xfrm>
+          <a:prstGeom prst="rect">
+            <a:avLst/>
+          </a:prstGeom>
+          <a:solidFill>
+            <a:schemeClr val="accent6">
+              <a:lumMod val="20000"/>
+              <a:lumOff val="80000"/>
+            </a:schemeClr>
+          </a:solidFill>
+          <a:ln w="38100"/>
+        </p:spPr>
+        <p:style>
+          <a:lnRef idx="2">
+            <a:schemeClr val="accent6"/>
+          </a:lnRef>
+          <a:fillRef idx="1">
+            <a:schemeClr val="lt1"/>
+          </a:fillRef>
+          <a:effectRef idx="0">
+            <a:schemeClr val="accent6"/>
+          </a:effectRef>
+          <a:fontRef idx="minor">
+            <a:schemeClr val="dk1"/>
+          </a:fontRef>
+        </p:style>
+        <p:txBody>
+          <a:bodyPr rtlCol="0" anchor="ctr"/>
+          <a:lstStyle/>
+          <a:p>
+            <a:pPr algn="ctr"/>
+            <a:r>
+              <a:rPr lang="en-US" dirty="0"/>
+              <a:t>Train model</a:t>
+            </a:r>
+          </a:p>
+        </p:txBody>
+      </p:sp>
+      <p:sp>
+        <p:nvSpPr>
+          <p:cNvPr id="34" name="Rectangle 33">
+            <a:extLst>
+              <a:ext uri="{FF2B5EF4-FFF2-40B4-BE49-F238E27FC236}">
+                <a16:creationId xmlns:a16="http://schemas.microsoft.com/office/drawing/2014/main" id="{6DEA08D2-01EE-4E8F-AF71-C2F24A503806}"/>
+              </a:ext>
+            </a:extLst>
+          </p:cNvPr>
+          <p:cNvSpPr/>
+          <p:nvPr/>
+        </p:nvSpPr>
+        <p:spPr>
+          <a:xfrm>
+            <a:off x="7645138" y="2668090"/>
+            <a:ext cx="2771480" cy="780311"/>
+          </a:xfrm>
+          <a:prstGeom prst="rect">
+            <a:avLst/>
+          </a:prstGeom>
+          <a:solidFill>
+            <a:schemeClr val="accent6">
+              <a:lumMod val="20000"/>
+              <a:lumOff val="80000"/>
+            </a:schemeClr>
+          </a:solidFill>
+          <a:ln w="38100"/>
+        </p:spPr>
+        <p:style>
+          <a:lnRef idx="2">
+            <a:schemeClr val="accent6"/>
+          </a:lnRef>
+          <a:fillRef idx="1">
+            <a:schemeClr val="lt1"/>
+          </a:fillRef>
+          <a:effectRef idx="0">
+            <a:schemeClr val="accent6"/>
+          </a:effectRef>
+          <a:fontRef idx="minor">
+            <a:schemeClr val="dk1"/>
+          </a:fontRef>
+        </p:style>
+        <p:txBody>
+          <a:bodyPr rtlCol="0" anchor="ctr"/>
+          <a:lstStyle/>
+          <a:p>
+            <a:pPr algn="ctr"/>
+            <a:r>
+              <a:rPr lang="en-US" dirty="0"/>
+              <a:t>Run python scripts to get recommended movies</a:t>
+            </a:r>
+          </a:p>
+        </p:txBody>
+      </p:sp>
+      <p:sp>
+        <p:nvSpPr>
+          <p:cNvPr id="37" name="Rectangle 36">
+            <a:extLst>
+              <a:ext uri="{FF2B5EF4-FFF2-40B4-BE49-F238E27FC236}">
+                <a16:creationId xmlns:a16="http://schemas.microsoft.com/office/drawing/2014/main" id="{308ED48F-390D-4BF1-B141-09184E11F042}"/>
+              </a:ext>
+            </a:extLst>
+          </p:cNvPr>
+          <p:cNvSpPr/>
+          <p:nvPr/>
+        </p:nvSpPr>
+        <p:spPr>
+          <a:xfrm>
+            <a:off x="7645138" y="4194689"/>
+            <a:ext cx="2771480" cy="780311"/>
+          </a:xfrm>
+          <a:prstGeom prst="rect">
+            <a:avLst/>
+          </a:prstGeom>
+        </p:spPr>
+        <p:style>
+          <a:lnRef idx="2">
+            <a:schemeClr val="accent6"/>
+          </a:lnRef>
+          <a:fillRef idx="1">
+            <a:schemeClr val="lt1"/>
+          </a:fillRef>
+          <a:effectRef idx="0">
+            <a:schemeClr val="accent6"/>
+          </a:effectRef>
+          <a:fontRef idx="minor">
+            <a:schemeClr val="dk1"/>
+          </a:fontRef>
+        </p:style>
+        <p:txBody>
+          <a:bodyPr rtlCol="0" anchor="ctr"/>
+          <a:lstStyle/>
+          <a:p>
+            <a:pPr algn="ctr"/>
+            <a:r>
+              <a:rPr lang="en-US" dirty="0"/>
+              <a:t>Potential Application: API</a:t>
+            </a:r>
+          </a:p>
+        </p:txBody>
+      </p:sp>
+      <p:cxnSp>
+        <p:nvCxnSpPr>
+          <p:cNvPr id="41" name="Connector: Elbow 40">
+            <a:extLst>
+              <a:ext uri="{FF2B5EF4-FFF2-40B4-BE49-F238E27FC236}">
+                <a16:creationId xmlns:a16="http://schemas.microsoft.com/office/drawing/2014/main" id="{867B2405-0046-45D7-9177-DD34F821A55C}"/>
+              </a:ext>
+            </a:extLst>
+          </p:cNvPr>
+          <p:cNvCxnSpPr>
+            <a:stCxn id="3" idx="3"/>
+            <a:endCxn id="37" idx="1"/>
+          </p:cNvCxnSpPr>
+          <p:nvPr/>
+        </p:nvCxnSpPr>
+        <p:spPr>
+          <a:xfrm>
+            <a:off x="4981738" y="3105833"/>
+            <a:ext cx="2663400" cy="1479012"/>
+          </a:xfrm>
+          <a:prstGeom prst="bentConnector3">
+            <a:avLst/>
+          </a:prstGeom>
+          <a:ln>
+            <a:tailEnd type="triangle"/>
+          </a:ln>
+        </p:spPr>
+        <p:style>
+          <a:lnRef idx="1">
+            <a:schemeClr val="accent6"/>
+          </a:lnRef>
+          <a:fillRef idx="0">
+            <a:schemeClr val="accent6"/>
+          </a:fillRef>
+          <a:effectRef idx="0">
+            <a:schemeClr val="accent6"/>
+          </a:effectRef>
+          <a:fontRef idx="minor">
+            <a:schemeClr val="tx1"/>
+          </a:fontRef>
+        </p:style>
+      </p:cxnSp>
     </p:spTree>
     <p:extLst>
       <p:ext uri="{BB962C8B-B14F-4D97-AF65-F5344CB8AC3E}">
@@ -10208,10 +11265,65 @@
       </p:grpSpPr>
       <p:sp>
         <p:nvSpPr>
-          <p:cNvPr id="4" name="TextBox 3">
-            <a:extLst>
-              <a:ext uri="{FF2B5EF4-FFF2-40B4-BE49-F238E27FC236}">
-                <a16:creationId xmlns:a16="http://schemas.microsoft.com/office/drawing/2014/main" id="{ED8F5CBA-C405-4FAD-8173-E2A3E6423540}"/>
+          <p:cNvPr id="3" name="Content Placeholder 2">
+            <a:extLst>
+              <a:ext uri="{FF2B5EF4-FFF2-40B4-BE49-F238E27FC236}">
+                <a16:creationId xmlns:a16="http://schemas.microsoft.com/office/drawing/2014/main" id="{CE52DBA4-670B-4F4E-A45A-1C268A0F2740}"/>
+              </a:ext>
+            </a:extLst>
+          </p:cNvPr>
+          <p:cNvSpPr>
+            <a:spLocks noGrp="1"/>
+          </p:cNvSpPr>
+          <p:nvPr>
+            <p:ph idx="1"/>
+          </p:nvPr>
+        </p:nvSpPr>
+        <p:spPr/>
+        <p:txBody>
+          <a:bodyPr/>
+          <a:lstStyle/>
+          <a:p>
+            <a:endParaRPr lang="en-US"/>
+          </a:p>
+        </p:txBody>
+      </p:sp>
+      <p:pic>
+        <p:nvPicPr>
+          <p:cNvPr id="5" name="Picture 4">
+            <a:extLst>
+              <a:ext uri="{FF2B5EF4-FFF2-40B4-BE49-F238E27FC236}">
+                <a16:creationId xmlns:a16="http://schemas.microsoft.com/office/drawing/2014/main" id="{BB73B533-2394-4F28-9868-DC592F884E9E}"/>
+              </a:ext>
+            </a:extLst>
+          </p:cNvPr>
+          <p:cNvPicPr>
+            <a:picLocks noChangeAspect="1"/>
+          </p:cNvPicPr>
+          <p:nvPr/>
+        </p:nvPicPr>
+        <p:blipFill>
+          <a:blip r:embed="rId2"/>
+          <a:stretch>
+            <a:fillRect/>
+          </a:stretch>
+        </p:blipFill>
+        <p:spPr>
+          <a:xfrm>
+            <a:off x="0" y="1044575"/>
+            <a:ext cx="12192000" cy="4768850"/>
+          </a:xfrm>
+          <a:prstGeom prst="rect">
+            <a:avLst/>
+          </a:prstGeom>
+        </p:spPr>
+      </p:pic>
+      <p:sp>
+        <p:nvSpPr>
+          <p:cNvPr id="6" name="TextBox 5">
+            <a:extLst>
+              <a:ext uri="{FF2B5EF4-FFF2-40B4-BE49-F238E27FC236}">
+                <a16:creationId xmlns:a16="http://schemas.microsoft.com/office/drawing/2014/main" id="{7F92651F-7BBF-442A-85A7-C56E2D3212AB}"/>
               </a:ext>
             </a:extLst>
           </p:cNvPr>
@@ -10251,10 +11363,64 @@
           </a:p>
         </p:txBody>
       </p:sp>
+      <p:sp>
+        <p:nvSpPr>
+          <p:cNvPr id="7" name="Rectangle 6">
+            <a:extLst>
+              <a:ext uri="{FF2B5EF4-FFF2-40B4-BE49-F238E27FC236}">
+                <a16:creationId xmlns:a16="http://schemas.microsoft.com/office/drawing/2014/main" id="{02D18407-36A4-44CB-9E4D-B47C0592E841}"/>
+              </a:ext>
+            </a:extLst>
+          </p:cNvPr>
+          <p:cNvSpPr/>
+          <p:nvPr/>
+        </p:nvSpPr>
+        <p:spPr>
+          <a:xfrm>
+            <a:off x="9078012" y="4157221"/>
+            <a:ext cx="754145" cy="1753385"/>
+          </a:xfrm>
+          <a:prstGeom prst="rect">
+            <a:avLst/>
+          </a:prstGeom>
+          <a:noFill/>
+          <a:ln w="38100" cap="flat" cmpd="sng" algn="ctr">
+            <a:solidFill>
+              <a:schemeClr val="accent6"/>
+            </a:solidFill>
+            <a:prstDash val="solid"/>
+            <a:round/>
+            <a:headEnd type="none" w="med" len="med"/>
+            <a:tailEnd type="none" w="med" len="med"/>
+          </a:ln>
+        </p:spPr>
+        <p:style>
+          <a:lnRef idx="0">
+            <a:scrgbClr r="0" g="0" b="0"/>
+          </a:lnRef>
+          <a:fillRef idx="0">
+            <a:scrgbClr r="0" g="0" b="0"/>
+          </a:fillRef>
+          <a:effectRef idx="0">
+            <a:scrgbClr r="0" g="0" b="0"/>
+          </a:effectRef>
+          <a:fontRef idx="minor">
+            <a:schemeClr val="accent6"/>
+          </a:fontRef>
+        </p:style>
+        <p:txBody>
+          <a:bodyPr rtlCol="0" anchor="ctr"/>
+          <a:lstStyle/>
+          <a:p>
+            <a:pPr algn="ctr"/>
+            <a:endParaRPr lang="en-US"/>
+          </a:p>
+        </p:txBody>
+      </p:sp>
     </p:spTree>
     <p:extLst>
       <p:ext uri="{BB962C8B-B14F-4D97-AF65-F5344CB8AC3E}">
-        <p14:creationId xmlns:p14="http://schemas.microsoft.com/office/powerpoint/2010/main" val="1511150889"/>
+        <p14:creationId xmlns:p14="http://schemas.microsoft.com/office/powerpoint/2010/main" val="3763478388"/>
       </p:ext>
     </p:extLst>
   </p:cSld>
@@ -10281,102 +11447,12 @@
           <a:chExt cx="0" cy="0"/>
         </a:xfrm>
       </p:grpSpPr>
-      <p:pic>
-        <p:nvPicPr>
-          <p:cNvPr id="4" name="Picture 3">
-            <a:extLst>
-              <a:ext uri="{FF2B5EF4-FFF2-40B4-BE49-F238E27FC236}">
-                <a16:creationId xmlns:a16="http://schemas.microsoft.com/office/drawing/2014/main" id="{26C01C37-F496-46CF-989A-EB270E222556}"/>
-              </a:ext>
-            </a:extLst>
-          </p:cNvPr>
-          <p:cNvPicPr>
-            <a:picLocks noChangeAspect="1"/>
-          </p:cNvPicPr>
-          <p:nvPr/>
-        </p:nvPicPr>
-        <p:blipFill>
-          <a:blip r:embed="rId2"/>
-          <a:stretch>
-            <a:fillRect/>
-          </a:stretch>
-        </p:blipFill>
-        <p:spPr>
-          <a:xfrm>
-            <a:off x="6172200" y="1072937"/>
-            <a:ext cx="6019800" cy="2647950"/>
-          </a:xfrm>
-          <a:prstGeom prst="rect">
-            <a:avLst/>
-          </a:prstGeom>
-        </p:spPr>
-      </p:pic>
-      <p:pic>
-        <p:nvPicPr>
-          <p:cNvPr id="6" name="Picture 5">
-            <a:extLst>
-              <a:ext uri="{FF2B5EF4-FFF2-40B4-BE49-F238E27FC236}">
-                <a16:creationId xmlns:a16="http://schemas.microsoft.com/office/drawing/2014/main" id="{2297B3E6-2B6C-4A8D-9D8A-5EAF3FFB8088}"/>
-              </a:ext>
-            </a:extLst>
-          </p:cNvPr>
-          <p:cNvPicPr>
-            <a:picLocks noChangeAspect="1"/>
-          </p:cNvPicPr>
-          <p:nvPr/>
-        </p:nvPicPr>
-        <p:blipFill>
-          <a:blip r:embed="rId3"/>
-          <a:stretch>
-            <a:fillRect/>
-          </a:stretch>
-        </p:blipFill>
-        <p:spPr>
-          <a:xfrm>
-            <a:off x="6172200" y="3976559"/>
-            <a:ext cx="5572125" cy="2638425"/>
-          </a:xfrm>
-          <a:prstGeom prst="rect">
-            <a:avLst/>
-          </a:prstGeom>
-        </p:spPr>
-      </p:pic>
-      <p:pic>
-        <p:nvPicPr>
-          <p:cNvPr id="8" name="Picture 7">
-            <a:extLst>
-              <a:ext uri="{FF2B5EF4-FFF2-40B4-BE49-F238E27FC236}">
-                <a16:creationId xmlns:a16="http://schemas.microsoft.com/office/drawing/2014/main" id="{68013557-55A6-43AD-8286-CDC0DF6BD556}"/>
-              </a:ext>
-            </a:extLst>
-          </p:cNvPr>
-          <p:cNvPicPr>
-            <a:picLocks noChangeAspect="1"/>
-          </p:cNvPicPr>
-          <p:nvPr/>
-        </p:nvPicPr>
-        <p:blipFill>
-          <a:blip r:embed="rId4"/>
-          <a:stretch>
-            <a:fillRect/>
-          </a:stretch>
-        </p:blipFill>
-        <p:spPr>
-          <a:xfrm>
-            <a:off x="215088" y="3179640"/>
-            <a:ext cx="5476875" cy="2543175"/>
-          </a:xfrm>
-          <a:prstGeom prst="rect">
-            <a:avLst/>
-          </a:prstGeom>
-        </p:spPr>
-      </p:pic>
-      <p:sp>
-        <p:nvSpPr>
-          <p:cNvPr id="9" name="TextBox 8">
-            <a:extLst>
-              <a:ext uri="{FF2B5EF4-FFF2-40B4-BE49-F238E27FC236}">
-                <a16:creationId xmlns:a16="http://schemas.microsoft.com/office/drawing/2014/main" id="{F6F4993C-6676-47A3-B71E-D7356890347B}"/>
+      <p:sp>
+        <p:nvSpPr>
+          <p:cNvPr id="4" name="TextBox 3">
+            <a:extLst>
+              <a:ext uri="{FF2B5EF4-FFF2-40B4-BE49-F238E27FC236}">
+                <a16:creationId xmlns:a16="http://schemas.microsoft.com/office/drawing/2014/main" id="{ED8F5CBA-C405-4FAD-8173-E2A3E6423540}"/>
               </a:ext>
             </a:extLst>
           </p:cNvPr>
@@ -10385,143 +11461,7 @@
         </p:nvSpPr>
         <p:spPr>
           <a:xfrm>
-            <a:off x="8698418" y="622095"/>
-            <a:ext cx="1449421" cy="369332"/>
-          </a:xfrm>
-          <a:prstGeom prst="rect">
-            <a:avLst/>
-          </a:prstGeom>
-          <a:noFill/>
-        </p:spPr>
-        <p:txBody>
-          <a:bodyPr wrap="square" rtlCol="0">
-            <a:spAutoFit/>
-          </a:bodyPr>
-          <a:lstStyle/>
-          <a:p>
-            <a:r>
-              <a:rPr lang="en-US" dirty="0">
-                <a:ln w="0"/>
-                <a:effectLst>
-                  <a:outerShdw blurRad="38100" dist="19050" dir="2700000" algn="tl" rotWithShape="0">
-                    <a:schemeClr val="dk1">
-                      <a:alpha val="40000"/>
-                    </a:schemeClr>
-                  </a:outerShdw>
-                </a:effectLst>
-              </a:rPr>
-              <a:t>LSH cosine</a:t>
-            </a:r>
-          </a:p>
-        </p:txBody>
-      </p:sp>
-      <p:sp>
-        <p:nvSpPr>
-          <p:cNvPr id="10" name="TextBox 9">
-            <a:extLst>
-              <a:ext uri="{FF2B5EF4-FFF2-40B4-BE49-F238E27FC236}">
-                <a16:creationId xmlns:a16="http://schemas.microsoft.com/office/drawing/2014/main" id="{7271E471-8400-4A4D-A005-5109648C2B3B}"/>
-              </a:ext>
-            </a:extLst>
-          </p:cNvPr>
-          <p:cNvSpPr txBox="1"/>
-          <p:nvPr/>
-        </p:nvSpPr>
-        <p:spPr>
-          <a:xfrm>
-            <a:off x="2108740" y="2810308"/>
-            <a:ext cx="2094690" cy="369332"/>
-          </a:xfrm>
-          <a:prstGeom prst="rect">
-            <a:avLst/>
-          </a:prstGeom>
-          <a:noFill/>
-        </p:spPr>
-        <p:txBody>
-          <a:bodyPr wrap="square" rtlCol="0">
-            <a:spAutoFit/>
-          </a:bodyPr>
-          <a:lstStyle/>
-          <a:p>
-            <a:r>
-              <a:rPr lang="en-US" dirty="0">
-                <a:ln w="0"/>
-                <a:effectLst>
-                  <a:outerShdw blurRad="38100" dist="19050" dir="2700000" algn="tl" rotWithShape="0">
-                    <a:schemeClr val="dk1">
-                      <a:alpha val="40000"/>
-                    </a:schemeClr>
-                  </a:outerShdw>
-                </a:effectLst>
-              </a:rPr>
-              <a:t>Cosine similarity</a:t>
-            </a:r>
-          </a:p>
-        </p:txBody>
-      </p:sp>
-      <p:sp>
-        <p:nvSpPr>
-          <p:cNvPr id="7" name="TextBox 6">
-            <a:extLst>
-              <a:ext uri="{FF2B5EF4-FFF2-40B4-BE49-F238E27FC236}">
-                <a16:creationId xmlns:a16="http://schemas.microsoft.com/office/drawing/2014/main" id="{B5A461CB-05DD-4EB2-B888-306A9DF0331F}"/>
-              </a:ext>
-            </a:extLst>
-          </p:cNvPr>
-          <p:cNvSpPr txBox="1"/>
-          <p:nvPr/>
-        </p:nvSpPr>
-        <p:spPr>
-          <a:xfrm>
-            <a:off x="215088" y="808958"/>
-            <a:ext cx="8483600" cy="461665"/>
-          </a:xfrm>
-          <a:prstGeom prst="rect">
-            <a:avLst/>
-          </a:prstGeom>
-          <a:noFill/>
-        </p:spPr>
-        <p:txBody>
-          <a:bodyPr wrap="square" rtlCol="0">
-            <a:spAutoFit/>
-          </a:bodyPr>
-          <a:lstStyle/>
-          <a:p>
-            <a:r>
-              <a:rPr lang="en-US" sz="2400" b="1" dirty="0">
-                <a:ln w="0"/>
-                <a:effectLst>
-                  <a:outerShdw blurRad="38100" dist="19050" dir="2700000" algn="tl" rotWithShape="0">
-                    <a:schemeClr val="dk1">
-                      <a:alpha val="40000"/>
-                    </a:schemeClr>
-                  </a:outerShdw>
-                </a:effectLst>
-                <a:latin typeface="Garamond" panose="02020404030301010803" pitchFamily="18" charset="0"/>
-              </a:rPr>
-              <a:t>4.1 Contend-based filtering recommendations</a:t>
-            </a:r>
-            <a:endParaRPr lang="en-US" sz="1600" b="1" dirty="0">
-              <a:latin typeface="Garamond" panose="02020404030301010803" pitchFamily="18" charset="0"/>
-            </a:endParaRPr>
-          </a:p>
-        </p:txBody>
-      </p:sp>
-      <p:sp>
-        <p:nvSpPr>
-          <p:cNvPr id="11" name="TextBox 10">
-            <a:extLst>
-              <a:ext uri="{FF2B5EF4-FFF2-40B4-BE49-F238E27FC236}">
-                <a16:creationId xmlns:a16="http://schemas.microsoft.com/office/drawing/2014/main" id="{EF613FAE-C13D-403E-9E17-11A21E74DEA3}"/>
-              </a:ext>
-            </a:extLst>
-          </p:cNvPr>
-          <p:cNvSpPr txBox="1"/>
-          <p:nvPr/>
-        </p:nvSpPr>
-        <p:spPr>
-          <a:xfrm>
-            <a:off x="203200" y="355600"/>
+            <a:off x="317500" y="355600"/>
             <a:ext cx="7835900" cy="523220"/>
           </a:xfrm>
           <a:prstGeom prst="rect">
@@ -10547,50 +11487,99 @@
                 </a:effectLst>
                 <a:latin typeface="Garamond" panose="02020404030301010803" pitchFamily="18" charset="0"/>
               </a:rPr>
-              <a:t>4. Results </a:t>
-            </a:r>
-          </a:p>
-        </p:txBody>
-      </p:sp>
-      <p:sp>
-        <p:nvSpPr>
-          <p:cNvPr id="2" name="TextBox 1">
-            <a:extLst>
-              <a:ext uri="{FF2B5EF4-FFF2-40B4-BE49-F238E27FC236}">
-                <a16:creationId xmlns:a16="http://schemas.microsoft.com/office/drawing/2014/main" id="{1E2CCCE2-2D24-4FDC-B285-157F1CFE1EAB}"/>
-              </a:ext>
-            </a:extLst>
-          </p:cNvPr>
-          <p:cNvSpPr txBox="1"/>
-          <p:nvPr/>
-        </p:nvSpPr>
-        <p:spPr>
-          <a:xfrm>
-            <a:off x="1993900" y="1994299"/>
-            <a:ext cx="2768600" cy="461665"/>
+              <a:t>3. Project Interface</a:t>
+            </a:r>
+          </a:p>
+        </p:txBody>
+      </p:sp>
+      <p:pic>
+        <p:nvPicPr>
+          <p:cNvPr id="3" name="Picture 2">
+            <a:extLst>
+              <a:ext uri="{FF2B5EF4-FFF2-40B4-BE49-F238E27FC236}">
+                <a16:creationId xmlns:a16="http://schemas.microsoft.com/office/drawing/2014/main" id="{10EDF6DB-1578-4BD2-B1D6-DAFFCB8D224C}"/>
+              </a:ext>
+            </a:extLst>
+          </p:cNvPr>
+          <p:cNvPicPr>
+            <a:picLocks noChangeAspect="1"/>
+          </p:cNvPicPr>
+          <p:nvPr/>
+        </p:nvPicPr>
+        <p:blipFill>
+          <a:blip r:embed="rId2"/>
+          <a:stretch>
+            <a:fillRect/>
+          </a:stretch>
+        </p:blipFill>
+        <p:spPr>
+          <a:xfrm>
+            <a:off x="0" y="1014096"/>
+            <a:ext cx="12192000" cy="4829807"/>
           </a:xfrm>
           <a:prstGeom prst="rect">
             <a:avLst/>
           </a:prstGeom>
+        </p:spPr>
+      </p:pic>
+      <p:sp>
+        <p:nvSpPr>
+          <p:cNvPr id="5" name="Rectangle 4">
+            <a:extLst>
+              <a:ext uri="{FF2B5EF4-FFF2-40B4-BE49-F238E27FC236}">
+                <a16:creationId xmlns:a16="http://schemas.microsoft.com/office/drawing/2014/main" id="{3FBBE930-EB93-4601-8ABA-9CC77C36D053}"/>
+              </a:ext>
+            </a:extLst>
+          </p:cNvPr>
+          <p:cNvSpPr/>
+          <p:nvPr/>
+        </p:nvSpPr>
+        <p:spPr>
+          <a:xfrm>
+            <a:off x="4374037" y="3704734"/>
+            <a:ext cx="2253006" cy="1480008"/>
+          </a:xfrm>
+          <a:prstGeom prst="rect">
+            <a:avLst/>
+          </a:prstGeom>
           <a:noFill/>
-        </p:spPr>
-        <p:txBody>
-          <a:bodyPr wrap="square" rtlCol="0">
-            <a:spAutoFit/>
-          </a:bodyPr>
-          <a:lstStyle/>
-          <a:p>
-            <a:r>
-              <a:rPr lang="en-US" sz="2400" dirty="0"/>
-              <a:t>Using a sample</a:t>
-            </a:r>
+          <a:ln w="38100" cap="flat" cmpd="sng" algn="ctr">
+            <a:solidFill>
+              <a:schemeClr val="accent6"/>
+            </a:solidFill>
+            <a:prstDash val="solid"/>
+            <a:round/>
+            <a:headEnd type="none" w="med" len="med"/>
+            <a:tailEnd type="none" w="med" len="med"/>
+          </a:ln>
+        </p:spPr>
+        <p:style>
+          <a:lnRef idx="0">
+            <a:scrgbClr r="0" g="0" b="0"/>
+          </a:lnRef>
+          <a:fillRef idx="0">
+            <a:scrgbClr r="0" g="0" b="0"/>
+          </a:fillRef>
+          <a:effectRef idx="0">
+            <a:scrgbClr r="0" g="0" b="0"/>
+          </a:effectRef>
+          <a:fontRef idx="minor">
+            <a:schemeClr val="accent6"/>
+          </a:fontRef>
+        </p:style>
+        <p:txBody>
+          <a:bodyPr rtlCol="0" anchor="ctr"/>
+          <a:lstStyle/>
+          <a:p>
+            <a:pPr algn="ctr"/>
+            <a:endParaRPr lang="en-US"/>
           </a:p>
         </p:txBody>
       </p:sp>
     </p:spTree>
     <p:extLst>
       <p:ext uri="{BB962C8B-B14F-4D97-AF65-F5344CB8AC3E}">
-        <p14:creationId xmlns:p14="http://schemas.microsoft.com/office/powerpoint/2010/main" val="3665934960"/>
+        <p14:creationId xmlns:p14="http://schemas.microsoft.com/office/powerpoint/2010/main" val="1511150889"/>
       </p:ext>
     </p:extLst>
   </p:cSld>

</xml_diff>